<commit_message>
serving site with Power Tips- November 2020
</commit_message>
<xml_diff>
--- a/public/featured-flag-template.pptx
+++ b/public/featured-flag-template.pptx
@@ -7,6 +7,7 @@
   <p:sldIdLst>
     <p:sldId id="259" r:id="rId5"/>
     <p:sldId id="261" r:id="rId6"/>
+    <p:sldId id="262" r:id="rId7"/>
   </p:sldIdLst>
   <p:sldSz cx="7315200" cy="5376863"/>
   <p:notesSz cx="6858000" cy="9144000"/>
@@ -256,7 +257,7 @@
           <a:p>
             <a:fld id="{699082D2-728E-47B7-AA51-904213E59808}" type="datetimeFigureOut">
               <a:rPr lang="en-US" smtClean="0"/>
-              <a:t>7/25/2019</a:t>
+              <a:t>1/24/2021</a:t>
             </a:fld>
             <a:endParaRPr lang="en-US"/>
           </a:p>
@@ -426,7 +427,7 @@
           <a:p>
             <a:fld id="{699082D2-728E-47B7-AA51-904213E59808}" type="datetimeFigureOut">
               <a:rPr lang="en-US" smtClean="0"/>
-              <a:t>7/25/2019</a:t>
+              <a:t>1/24/2021</a:t>
             </a:fld>
             <a:endParaRPr lang="en-US"/>
           </a:p>
@@ -606,7 +607,7 @@
           <a:p>
             <a:fld id="{699082D2-728E-47B7-AA51-904213E59808}" type="datetimeFigureOut">
               <a:rPr lang="en-US" smtClean="0"/>
-              <a:t>7/25/2019</a:t>
+              <a:t>1/24/2021</a:t>
             </a:fld>
             <a:endParaRPr lang="en-US"/>
           </a:p>
@@ -776,7 +777,7 @@
           <a:p>
             <a:fld id="{699082D2-728E-47B7-AA51-904213E59808}" type="datetimeFigureOut">
               <a:rPr lang="en-US" smtClean="0"/>
-              <a:t>7/25/2019</a:t>
+              <a:t>1/24/2021</a:t>
             </a:fld>
             <a:endParaRPr lang="en-US"/>
           </a:p>
@@ -1020,7 +1021,7 @@
           <a:p>
             <a:fld id="{699082D2-728E-47B7-AA51-904213E59808}" type="datetimeFigureOut">
               <a:rPr lang="en-US" smtClean="0"/>
-              <a:t>7/25/2019</a:t>
+              <a:t>1/24/2021</a:t>
             </a:fld>
             <a:endParaRPr lang="en-US"/>
           </a:p>
@@ -1252,7 +1253,7 @@
           <a:p>
             <a:fld id="{699082D2-728E-47B7-AA51-904213E59808}" type="datetimeFigureOut">
               <a:rPr lang="en-US" smtClean="0"/>
-              <a:t>7/25/2019</a:t>
+              <a:t>1/24/2021</a:t>
             </a:fld>
             <a:endParaRPr lang="en-US"/>
           </a:p>
@@ -1619,7 +1620,7 @@
           <a:p>
             <a:fld id="{699082D2-728E-47B7-AA51-904213E59808}" type="datetimeFigureOut">
               <a:rPr lang="en-US" smtClean="0"/>
-              <a:t>7/25/2019</a:t>
+              <a:t>1/24/2021</a:t>
             </a:fld>
             <a:endParaRPr lang="en-US"/>
           </a:p>
@@ -1737,7 +1738,7 @@
           <a:p>
             <a:fld id="{699082D2-728E-47B7-AA51-904213E59808}" type="datetimeFigureOut">
               <a:rPr lang="en-US" smtClean="0"/>
-              <a:t>7/25/2019</a:t>
+              <a:t>1/24/2021</a:t>
             </a:fld>
             <a:endParaRPr lang="en-US"/>
           </a:p>
@@ -1832,7 +1833,7 @@
           <a:p>
             <a:fld id="{699082D2-728E-47B7-AA51-904213E59808}" type="datetimeFigureOut">
               <a:rPr lang="en-US" smtClean="0"/>
-              <a:t>7/25/2019</a:t>
+              <a:t>1/24/2021</a:t>
             </a:fld>
             <a:endParaRPr lang="en-US"/>
           </a:p>
@@ -2109,7 +2110,7 @@
           <a:p>
             <a:fld id="{699082D2-728E-47B7-AA51-904213E59808}" type="datetimeFigureOut">
               <a:rPr lang="en-US" smtClean="0"/>
-              <a:t>7/25/2019</a:t>
+              <a:t>1/24/2021</a:t>
             </a:fld>
             <a:endParaRPr lang="en-US"/>
           </a:p>
@@ -2366,7 +2367,7 @@
           <a:p>
             <a:fld id="{699082D2-728E-47B7-AA51-904213E59808}" type="datetimeFigureOut">
               <a:rPr lang="en-US" smtClean="0"/>
-              <a:t>7/25/2019</a:t>
+              <a:t>1/24/2021</a:t>
             </a:fld>
             <a:endParaRPr lang="en-US"/>
           </a:p>
@@ -2579,7 +2580,7 @@
           <a:p>
             <a:fld id="{699082D2-728E-47B7-AA51-904213E59808}" type="datetimeFigureOut">
               <a:rPr lang="en-US" smtClean="0"/>
-              <a:t>7/25/2019</a:t>
+              <a:t>1/24/2021</a:t>
             </a:fld>
             <a:endParaRPr lang="en-US"/>
           </a:p>
@@ -6797,6 +6798,240 @@
 </p:sld>
 </file>
 
+<file path=ppt/slides/slide3.xml><?xml version="1.0" encoding="utf-8"?>
+<p:sld xmlns:a="http://schemas.openxmlformats.org/drawingml/2006/main" xmlns:r="http://schemas.openxmlformats.org/officeDocument/2006/relationships" xmlns:p="http://schemas.openxmlformats.org/presentationml/2006/main">
+  <p:cSld>
+    <p:spTree>
+      <p:nvGrpSpPr>
+        <p:cNvPr id="1" name=""/>
+        <p:cNvGrpSpPr/>
+        <p:nvPr/>
+      </p:nvGrpSpPr>
+      <p:grpSpPr>
+        <a:xfrm>
+          <a:off x="0" y="0"/>
+          <a:ext cx="0" cy="0"/>
+          <a:chOff x="0" y="0"/>
+          <a:chExt cx="0" cy="0"/>
+        </a:xfrm>
+      </p:grpSpPr>
+      <p:sp>
+        <p:nvSpPr>
+          <p:cNvPr id="4" name="Rectangle 3">
+            <a:extLst>
+              <a:ext uri="{FF2B5EF4-FFF2-40B4-BE49-F238E27FC236}">
+                <a16:creationId xmlns:a16="http://schemas.microsoft.com/office/drawing/2014/main" id="{C7655D2B-19B8-4DFA-9021-B1ECC94B9D22}"/>
+              </a:ext>
+            </a:extLst>
+          </p:cNvPr>
+          <p:cNvSpPr/>
+          <p:nvPr/>
+        </p:nvSpPr>
+        <p:spPr>
+          <a:xfrm>
+            <a:off x="0" y="2237"/>
+            <a:ext cx="7315200" cy="5375871"/>
+          </a:xfrm>
+          <a:prstGeom prst="rect">
+            <a:avLst/>
+          </a:prstGeom>
+          <a:solidFill>
+            <a:schemeClr val="bg1"/>
+          </a:solidFill>
+          <a:ln>
+            <a:noFill/>
+          </a:ln>
+        </p:spPr>
+        <p:style>
+          <a:lnRef idx="2">
+            <a:schemeClr val="accent1">
+              <a:shade val="50000"/>
+            </a:schemeClr>
+          </a:lnRef>
+          <a:fillRef idx="1">
+            <a:schemeClr val="accent1"/>
+          </a:fillRef>
+          <a:effectRef idx="0">
+            <a:schemeClr val="accent1"/>
+          </a:effectRef>
+          <a:fontRef idx="minor">
+            <a:schemeClr val="lt1"/>
+          </a:fontRef>
+        </p:style>
+        <p:txBody>
+          <a:bodyPr rtlCol="0" anchor="ctr"/>
+          <a:lstStyle/>
+          <a:p>
+            <a:pPr algn="ctr"/>
+            <a:endParaRPr lang="en-US">
+              <a:latin typeface="Arial" panose="020B0604020202020204" pitchFamily="34" charset="0"/>
+              <a:cs typeface="Arial" panose="020B0604020202020204" pitchFamily="34" charset="0"/>
+            </a:endParaRPr>
+          </a:p>
+        </p:txBody>
+      </p:sp>
+      <p:sp>
+        <p:nvSpPr>
+          <p:cNvPr id="5" name="Rectangle 4">
+            <a:extLst>
+              <a:ext uri="{FF2B5EF4-FFF2-40B4-BE49-F238E27FC236}">
+                <a16:creationId xmlns:a16="http://schemas.microsoft.com/office/drawing/2014/main" id="{D7B3B870-1F00-4BCE-B580-A12C4F1B87D4}"/>
+              </a:ext>
+            </a:extLst>
+          </p:cNvPr>
+          <p:cNvSpPr/>
+          <p:nvPr/>
+        </p:nvSpPr>
+        <p:spPr>
+          <a:xfrm>
+            <a:off x="0" y="629162"/>
+            <a:ext cx="7315200" cy="4114800"/>
+          </a:xfrm>
+          <a:prstGeom prst="rect">
+            <a:avLst/>
+          </a:prstGeom>
+          <a:solidFill>
+            <a:schemeClr val="bg1"/>
+          </a:solidFill>
+          <a:ln>
+            <a:noFill/>
+          </a:ln>
+        </p:spPr>
+        <p:style>
+          <a:lnRef idx="2">
+            <a:schemeClr val="accent3">
+              <a:shade val="50000"/>
+            </a:schemeClr>
+          </a:lnRef>
+          <a:fillRef idx="1">
+            <a:schemeClr val="accent3"/>
+          </a:fillRef>
+          <a:effectRef idx="0">
+            <a:schemeClr val="accent3"/>
+          </a:effectRef>
+          <a:fontRef idx="minor">
+            <a:schemeClr val="lt1"/>
+          </a:fontRef>
+        </p:style>
+        <p:txBody>
+          <a:bodyPr rtlCol="0" anchor="ctr"/>
+          <a:lstStyle/>
+          <a:p>
+            <a:pPr algn="ctr"/>
+            <a:endParaRPr lang="en-US" dirty="0">
+              <a:solidFill>
+                <a:schemeClr val="accent2"/>
+              </a:solidFill>
+              <a:latin typeface="Arial" panose="020B0604020202020204" pitchFamily="34" charset="0"/>
+              <a:cs typeface="Arial" panose="020B0604020202020204" pitchFamily="34" charset="0"/>
+            </a:endParaRPr>
+          </a:p>
+        </p:txBody>
+      </p:sp>
+      <p:sp>
+        <p:nvSpPr>
+          <p:cNvPr id="20" name="Rectangle 19">
+            <a:extLst>
+              <a:ext uri="{FF2B5EF4-FFF2-40B4-BE49-F238E27FC236}">
+                <a16:creationId xmlns:a16="http://schemas.microsoft.com/office/drawing/2014/main" id="{44B3C268-0FD1-4AA2-A775-2C1F6C3D736C}"/>
+              </a:ext>
+            </a:extLst>
+          </p:cNvPr>
+          <p:cNvSpPr/>
+          <p:nvPr/>
+        </p:nvSpPr>
+        <p:spPr>
+          <a:xfrm>
+            <a:off x="0" y="1405780"/>
+            <a:ext cx="7315200" cy="2560320"/>
+          </a:xfrm>
+          <a:prstGeom prst="rect">
+            <a:avLst/>
+          </a:prstGeom>
+          <a:solidFill>
+            <a:schemeClr val="bg1"/>
+          </a:solidFill>
+          <a:ln>
+            <a:noFill/>
+          </a:ln>
+        </p:spPr>
+        <p:style>
+          <a:lnRef idx="2">
+            <a:schemeClr val="accent1">
+              <a:shade val="50000"/>
+            </a:schemeClr>
+          </a:lnRef>
+          <a:fillRef idx="1">
+            <a:schemeClr val="accent1"/>
+          </a:fillRef>
+          <a:effectRef idx="0">
+            <a:schemeClr val="accent1"/>
+          </a:effectRef>
+          <a:fontRef idx="minor">
+            <a:schemeClr val="lt1"/>
+          </a:fontRef>
+        </p:style>
+        <p:txBody>
+          <a:bodyPr rtlCol="0" anchor="ctr"/>
+          <a:lstStyle/>
+          <a:p>
+            <a:pPr algn="ctr"/>
+            <a:endParaRPr lang="en-US">
+              <a:latin typeface="Arial" panose="020B0604020202020204" pitchFamily="34" charset="0"/>
+              <a:cs typeface="Arial" panose="020B0604020202020204" pitchFamily="34" charset="0"/>
+            </a:endParaRPr>
+          </a:p>
+        </p:txBody>
+      </p:sp>
+      <p:pic>
+        <p:nvPicPr>
+          <p:cNvPr id="3" name="Picture 2" descr="A close up of a keyboard&#10;&#10;Description automatically generated">
+            <a:extLst>
+              <a:ext uri="{FF2B5EF4-FFF2-40B4-BE49-F238E27FC236}">
+                <a16:creationId xmlns:a16="http://schemas.microsoft.com/office/drawing/2014/main" id="{35046DA1-9A00-455E-9E05-4F60A1C8BDB4}"/>
+              </a:ext>
+            </a:extLst>
+          </p:cNvPr>
+          <p:cNvPicPr>
+            <a:picLocks noChangeAspect="1"/>
+          </p:cNvPicPr>
+          <p:nvPr/>
+        </p:nvPicPr>
+        <p:blipFill>
+          <a:blip r:embed="rId2">
+            <a:extLst>
+              <a:ext uri="{28A0092B-C50C-407E-A947-70E740481C1C}">
+                <a14:useLocalDpi xmlns:a14="http://schemas.microsoft.com/office/drawing/2010/main" val="0"/>
+              </a:ext>
+            </a:extLst>
+          </a:blip>
+          <a:stretch>
+            <a:fillRect/>
+          </a:stretch>
+        </p:blipFill>
+        <p:spPr>
+          <a:xfrm>
+            <a:off x="0" y="1405780"/>
+            <a:ext cx="1711036" cy="748578"/>
+          </a:xfrm>
+          <a:prstGeom prst="rect">
+            <a:avLst/>
+          </a:prstGeom>
+        </p:spPr>
+      </p:pic>
+    </p:spTree>
+    <p:extLst>
+      <p:ext uri="{BB962C8B-B14F-4D97-AF65-F5344CB8AC3E}">
+        <p14:creationId xmlns:p14="http://schemas.microsoft.com/office/powerpoint/2010/main" val="654158797"/>
+      </p:ext>
+    </p:extLst>
+  </p:cSld>
+  <p:clrMapOvr>
+    <a:masterClrMapping/>
+  </p:clrMapOvr>
+</p:sld>
+</file>
+
 <file path=ppt/theme/theme1.xml><?xml version="1.0" encoding="utf-8"?>
 <a:theme xmlns:a="http://schemas.openxmlformats.org/drawingml/2006/main" name="Office Theme">
   <a:themeElements>
@@ -7059,6 +7294,24 @@
 </file>
 
 <file path=customXml/item1.xml><?xml version="1.0" encoding="utf-8"?>
+<p:properties xmlns:p="http://schemas.microsoft.com/office/2006/metadata/properties" xmlns:xsi="http://www.w3.org/2001/XMLSchema-instance" xmlns:pc="http://schemas.microsoft.com/office/infopath/2007/PartnerControls">
+  <documentManagement>
+    <_ip_UnifiedCompliancePolicyUIAction xmlns="http://schemas.microsoft.com/sharepoint/v3" xsi:nil="true"/>
+    <_ip_UnifiedCompliancePolicyProperties xmlns="http://schemas.microsoft.com/sharepoint/v3" xsi:nil="true"/>
+  </documentManagement>
+</p:properties>
+</file>
+
+<file path=customXml/item2.xml><?xml version="1.0" encoding="utf-8"?>
+<?mso-contentType ?>
+<FormTemplates xmlns="http://schemas.microsoft.com/sharepoint/v3/contenttype/forms">
+  <Display>DocumentLibraryForm</Display>
+  <Edit>DocumentLibraryForm</Edit>
+  <New>DocumentLibraryForm</New>
+</FormTemplates>
+</file>
+
+<file path=customXml/item3.xml><?xml version="1.0" encoding="utf-8"?>
 <ct:contentTypeSchema xmlns:ct="http://schemas.microsoft.com/office/2006/metadata/contentType" xmlns:ma="http://schemas.microsoft.com/office/2006/metadata/properties/metaAttributes" ct:_="" ma:_="" ma:contentTypeName="Document" ma:contentTypeID="0x01010007A4C25A60F58F4F9E2D77EB700D4DDD" ma:contentTypeVersion="15" ma:contentTypeDescription="Create a new document." ma:contentTypeScope="" ma:versionID="8710c4c97b9e130be92970e6791c71a6">
   <xsd:schema xmlns:xsd="http://www.w3.org/2001/XMLSchema" xmlns:xs="http://www.w3.org/2001/XMLSchema" xmlns:p="http://schemas.microsoft.com/office/2006/metadata/properties" xmlns:ns1="http://schemas.microsoft.com/sharepoint/v3" xmlns:ns3="216bde26-9634-4d6a-91fe-0c0c14b20b90" xmlns:ns4="c8e4db4b-48df-4a0d-a5ad-b048e586ef36" targetNamespace="http://schemas.microsoft.com/office/2006/metadata/properties" ma:root="true" ma:fieldsID="21a0cc795564e7308a3e331186d6c256" ns1:_="" ns3:_="" ns4:_="">
     <xsd:import namespace="http://schemas.microsoft.com/sharepoint/v3"/>
@@ -7298,25 +7551,33 @@
 </ct:contentTypeSchema>
 </file>
 
-<file path=customXml/item2.xml><?xml version="1.0" encoding="utf-8"?>
-<?mso-contentType ?>
-<FormTemplates xmlns="http://schemas.microsoft.com/sharepoint/v3/contenttype/forms">
-  <Display>DocumentLibraryForm</Display>
-  <Edit>DocumentLibraryForm</Edit>
-  <New>DocumentLibraryForm</New>
-</FormTemplates>
+<file path=customXml/itemProps1.xml><?xml version="1.0" encoding="utf-8"?>
+<ds:datastoreItem xmlns:ds="http://schemas.openxmlformats.org/officeDocument/2006/customXml" ds:itemID="{92329657-48FE-49A3-A424-7C5B871C3595}">
+  <ds:schemaRefs>
+    <ds:schemaRef ds:uri="http://schemas.microsoft.com/office/2006/documentManagement/types"/>
+    <ds:schemaRef ds:uri="http://purl.org/dc/elements/1.1/"/>
+    <ds:schemaRef ds:uri="http://schemas.microsoft.com/office/2006/metadata/properties"/>
+    <ds:schemaRef ds:uri="http://schemas.microsoft.com/sharepoint/v3"/>
+    <ds:schemaRef ds:uri="http://schemas.microsoft.com/office/infopath/2007/PartnerControls"/>
+    <ds:schemaRef ds:uri="http://www.w3.org/XML/1998/namespace"/>
+    <ds:schemaRef ds:uri="216bde26-9634-4d6a-91fe-0c0c14b20b90"/>
+    <ds:schemaRef ds:uri="http://purl.org/dc/terms/"/>
+    <ds:schemaRef ds:uri="http://schemas.openxmlformats.org/package/2006/metadata/core-properties"/>
+    <ds:schemaRef ds:uri="c8e4db4b-48df-4a0d-a5ad-b048e586ef36"/>
+    <ds:schemaRef ds:uri="http://purl.org/dc/dcmitype/"/>
+  </ds:schemaRefs>
+</ds:datastoreItem>
 </file>
 
-<file path=customXml/item3.xml><?xml version="1.0" encoding="utf-8"?>
-<p:properties xmlns:p="http://schemas.microsoft.com/office/2006/metadata/properties" xmlns:xsi="http://www.w3.org/2001/XMLSchema-instance" xmlns:pc="http://schemas.microsoft.com/office/infopath/2007/PartnerControls">
-  <documentManagement>
-    <_ip_UnifiedCompliancePolicyUIAction xmlns="http://schemas.microsoft.com/sharepoint/v3" xsi:nil="true"/>
-    <_ip_UnifiedCompliancePolicyProperties xmlns="http://schemas.microsoft.com/sharepoint/v3" xsi:nil="true"/>
-  </documentManagement>
-</p:properties>
+<file path=customXml/itemProps2.xml><?xml version="1.0" encoding="utf-8"?>
+<ds:datastoreItem xmlns:ds="http://schemas.openxmlformats.org/officeDocument/2006/customXml" ds:itemID="{07AA66D3-A468-4FD2-B192-9E6BD79914F3}">
+  <ds:schemaRefs>
+    <ds:schemaRef ds:uri="http://schemas.microsoft.com/sharepoint/v3/contenttype/forms"/>
+  </ds:schemaRefs>
+</ds:datastoreItem>
 </file>
 
-<file path=customXml/itemProps1.xml><?xml version="1.0" encoding="utf-8"?>
+<file path=customXml/itemProps3.xml><?xml version="1.0" encoding="utf-8"?>
 <ds:datastoreItem xmlns:ds="http://schemas.openxmlformats.org/officeDocument/2006/customXml" ds:itemID="{8ABEFD2E-E45F-4181-A504-5D747E6F588B}">
   <ds:schemaRefs>
     <ds:schemaRef ds:uri="http://schemas.microsoft.com/office/2006/metadata/contentType"/>
@@ -7334,30 +7595,4 @@
     <ds:schemaRef ds:uri="http://schemas.microsoft.com/internal/obd"/>
   </ds:schemaRefs>
 </ds:datastoreItem>
-</file>
-
-<file path=customXml/itemProps2.xml><?xml version="1.0" encoding="utf-8"?>
-<ds:datastoreItem xmlns:ds="http://schemas.openxmlformats.org/officeDocument/2006/customXml" ds:itemID="{07AA66D3-A468-4FD2-B192-9E6BD79914F3}">
-  <ds:schemaRefs>
-    <ds:schemaRef ds:uri="http://schemas.microsoft.com/sharepoint/v3/contenttype/forms"/>
-  </ds:schemaRefs>
-</ds:datastoreItem>
-</file>
-
-<file path=customXml/itemProps3.xml><?xml version="1.0" encoding="utf-8"?>
-<ds:datastoreItem xmlns:ds="http://schemas.openxmlformats.org/officeDocument/2006/customXml" ds:itemID="{92329657-48FE-49A3-A424-7C5B871C3595}">
-  <ds:schemaRefs>
-    <ds:schemaRef ds:uri="http://schemas.microsoft.com/office/2006/documentManagement/types"/>
-    <ds:schemaRef ds:uri="http://purl.org/dc/elements/1.1/"/>
-    <ds:schemaRef ds:uri="http://schemas.microsoft.com/office/2006/metadata/properties"/>
-    <ds:schemaRef ds:uri="http://schemas.microsoft.com/sharepoint/v3"/>
-    <ds:schemaRef ds:uri="http://schemas.microsoft.com/office/infopath/2007/PartnerControls"/>
-    <ds:schemaRef ds:uri="http://www.w3.org/XML/1998/namespace"/>
-    <ds:schemaRef ds:uri="216bde26-9634-4d6a-91fe-0c0c14b20b90"/>
-    <ds:schemaRef ds:uri="http://purl.org/dc/terms/"/>
-    <ds:schemaRef ds:uri="http://schemas.openxmlformats.org/package/2006/metadata/core-properties"/>
-    <ds:schemaRef ds:uri="c8e4db4b-48df-4a0d-a5ad-b048e586ef36"/>
-    <ds:schemaRef ds:uri="http://purl.org/dc/dcmitype/"/>
-  </ds:schemaRefs>
-</ds:datastoreItem>
 </file>
</xml_diff>